<commit_message>
pushing it to tom
</commit_message>
<xml_diff>
--- a/Paper/Finale Presentatie/presentatie.pptx
+++ b/Paper/Finale Presentatie/presentatie.pptx
@@ -6,10 +6,10 @@
     <p:sldMasterId id="2147483710" r:id="rId2"/>
   </p:sldMasterIdLst>
   <p:notesMasterIdLst>
-    <p:notesMasterId r:id="rId30"/>
+    <p:notesMasterId r:id="rId34"/>
   </p:notesMasterIdLst>
   <p:handoutMasterIdLst>
-    <p:handoutMasterId r:id="rId31"/>
+    <p:handoutMasterId r:id="rId35"/>
   </p:handoutMasterIdLst>
   <p:sldIdLst>
     <p:sldId id="256" r:id="rId3"/>
@@ -31,14 +31,18 @@
     <p:sldId id="267" r:id="rId19"/>
     <p:sldId id="280" r:id="rId20"/>
     <p:sldId id="281" r:id="rId21"/>
-    <p:sldId id="283" r:id="rId22"/>
-    <p:sldId id="272" r:id="rId23"/>
-    <p:sldId id="271" r:id="rId24"/>
-    <p:sldId id="276" r:id="rId25"/>
-    <p:sldId id="273" r:id="rId26"/>
-    <p:sldId id="275" r:id="rId27"/>
-    <p:sldId id="274" r:id="rId28"/>
-    <p:sldId id="284" r:id="rId29"/>
+    <p:sldId id="285" r:id="rId22"/>
+    <p:sldId id="286" r:id="rId23"/>
+    <p:sldId id="287" r:id="rId24"/>
+    <p:sldId id="283" r:id="rId25"/>
+    <p:sldId id="272" r:id="rId26"/>
+    <p:sldId id="288" r:id="rId27"/>
+    <p:sldId id="271" r:id="rId28"/>
+    <p:sldId id="276" r:id="rId29"/>
+    <p:sldId id="273" r:id="rId30"/>
+    <p:sldId id="275" r:id="rId31"/>
+    <p:sldId id="274" r:id="rId32"/>
+    <p:sldId id="284" r:id="rId33"/>
   </p:sldIdLst>
   <p:sldSz cx="9144000" cy="6858000" type="screen4x3"/>
   <p:notesSz cx="6858000" cy="9144000"/>
@@ -20491,8 +20495,44 @@
             <a:p>
               <a:pPr algn="ctr"/>
               <a:r>
+                <a:rPr lang="en-US" dirty="0" err="1" smtClean="0"/>
+                <a:t>Er</a:t>
+              </a:r>
+              <a:r>
                 <a:rPr lang="en-US" dirty="0" smtClean="0"/>
-                <a:t>Reductiemogelijkheden in de boom (#Aantal knopen)</a:t>
+                <a:t> </a:t>
+              </a:r>
+              <a:r>
+                <a:rPr lang="en-US" dirty="0" err="1" smtClean="0"/>
+                <a:t>zijn</a:t>
+              </a:r>
+              <a:r>
+                <a:rPr lang="en-US" dirty="0" smtClean="0"/>
+                <a:t> </a:t>
+              </a:r>
+              <a:r>
+                <a:rPr lang="en-US" dirty="0" err="1" smtClean="0"/>
+                <a:t>redundante</a:t>
+              </a:r>
+              <a:r>
+                <a:rPr lang="en-US" dirty="0" smtClean="0"/>
+                <a:t> </a:t>
+              </a:r>
+              <a:r>
+                <a:rPr lang="en-US" dirty="0" err="1" smtClean="0"/>
+                <a:t>knopen</a:t>
+              </a:r>
+              <a:r>
+                <a:rPr lang="en-US" dirty="0" smtClean="0"/>
+                <a:t> in de </a:t>
+              </a:r>
+              <a:r>
+                <a:rPr lang="en-US" dirty="0" err="1" smtClean="0"/>
+                <a:t>originele</a:t>
+              </a:r>
+              <a:r>
+                <a:rPr lang="en-US" dirty="0" smtClean="0"/>
+                <a:t> boom</a:t>
               </a:r>
               <a:endParaRPr lang="en-US" dirty="0"/>
             </a:p>
@@ -20625,8 +20665,48 @@
             <a:p>
               <a:pPr algn="ctr"/>
               <a:r>
+                <a:rPr lang="en-US" dirty="0" err="1" smtClean="0"/>
+                <a:t>Toevoeging</a:t>
+              </a:r>
+              <a:r>
                 <a:rPr lang="en-US" dirty="0" smtClean="0"/>
-                <a:t>Invloed van de boomreductie op de performance</a:t>
+                <a:t> van </a:t>
+              </a:r>
+              <a:r>
+                <a:rPr lang="en-US" dirty="0" err="1" smtClean="0"/>
+                <a:t>constanten</a:t>
+              </a:r>
+              <a:r>
+                <a:rPr lang="en-US" dirty="0" smtClean="0"/>
+                <a:t> </a:t>
+              </a:r>
+              <a:r>
+                <a:rPr lang="en-US" dirty="0" err="1" smtClean="0"/>
+                <a:t>heeft</a:t>
+              </a:r>
+              <a:r>
+                <a:rPr lang="en-US" dirty="0" smtClean="0"/>
+                <a:t> </a:t>
+              </a:r>
+              <a:r>
+                <a:rPr lang="en-US" dirty="0" err="1" smtClean="0"/>
+                <a:t>een</a:t>
+              </a:r>
+              <a:r>
+                <a:rPr lang="en-US" dirty="0" smtClean="0"/>
+                <a:t> </a:t>
+              </a:r>
+              <a:r>
+                <a:rPr lang="en-US" dirty="0" err="1" smtClean="0"/>
+                <a:t>postieve</a:t>
+              </a:r>
+              <a:r>
+                <a:rPr lang="en-US" dirty="0" smtClean="0"/>
+                <a:t> </a:t>
+              </a:r>
+              <a:r>
+                <a:rPr lang="en-US" dirty="0" err="1" smtClean="0"/>
+                <a:t>invloed</a:t>
               </a:r>
               <a:endParaRPr lang="en-US" dirty="0"/>
             </a:p>
@@ -20711,7 +20791,7 @@
         <p:grpSpPr>
           <a:xfrm>
             <a:off x="385208" y="4373312"/>
-            <a:ext cx="8353967" cy="620459"/>
+            <a:ext cx="8353967" cy="783880"/>
             <a:chOff x="385208" y="4373312"/>
             <a:chExt cx="8353967" cy="620459"/>
           </a:xfrm>
@@ -20759,8 +20839,103 @@
             <a:p>
               <a:pPr algn="ctr"/>
               <a:r>
+                <a:rPr lang="en-US" dirty="0" err="1" smtClean="0"/>
+                <a:t>Er</a:t>
+              </a:r>
+              <a:r>
                 <a:rPr lang="en-US" dirty="0" smtClean="0"/>
-                <a:t>[TEXT]</a:t>
+                <a:t> </a:t>
+              </a:r>
+              <a:r>
+                <a:rPr lang="en-US" dirty="0" err="1" smtClean="0"/>
+                <a:t>bestaat</a:t>
+              </a:r>
+              <a:r>
+                <a:rPr lang="en-US" dirty="0" smtClean="0"/>
+                <a:t> </a:t>
+              </a:r>
+              <a:r>
+                <a:rPr lang="en-US" dirty="0" err="1" smtClean="0"/>
+                <a:t>een</a:t>
+              </a:r>
+              <a:r>
+                <a:rPr lang="en-US" dirty="0" smtClean="0"/>
+                <a:t> </a:t>
+              </a:r>
+              <a:r>
+                <a:rPr lang="en-US" dirty="0" err="1" smtClean="0"/>
+                <a:t>goede</a:t>
+              </a:r>
+              <a:r>
+                <a:rPr lang="en-US" dirty="0" smtClean="0"/>
+                <a:t> </a:t>
+              </a:r>
+              <a:r>
+                <a:rPr lang="en-US" dirty="0" err="1" smtClean="0"/>
+                <a:t>afweging</a:t>
+              </a:r>
+              <a:r>
+                <a:rPr lang="en-US" dirty="0" smtClean="0"/>
+                <a:t> </a:t>
+              </a:r>
+              <a:r>
+                <a:rPr lang="en-US" dirty="0" err="1" smtClean="0"/>
+                <a:t>tussen</a:t>
+              </a:r>
+              <a:r>
+                <a:rPr lang="en-US" dirty="0" smtClean="0"/>
+                <a:t> het </a:t>
+              </a:r>
+              <a:r>
+                <a:rPr lang="en-US" dirty="0" err="1" smtClean="0"/>
+                <a:t>oplossings</a:t>
+              </a:r>
+              <a:r>
+                <a:rPr lang="en-US" dirty="0" smtClean="0"/>
+                <a:t>% en </a:t>
+              </a:r>
+              <a:br>
+                <a:rPr lang="en-US" dirty="0" smtClean="0"/>
+              </a:br>
+              <a:r>
+                <a:rPr lang="en-US" dirty="0" smtClean="0"/>
+                <a:t>de </a:t>
+              </a:r>
+              <a:r>
+                <a:rPr lang="en-US" dirty="0" err="1" smtClean="0"/>
+                <a:t>benodigde</a:t>
+              </a:r>
+              <a:r>
+                <a:rPr lang="en-US" dirty="0" smtClean="0"/>
+                <a:t> </a:t>
+              </a:r>
+              <a:r>
+                <a:rPr lang="en-US" dirty="0" err="1" smtClean="0"/>
+                <a:t>tijd</a:t>
+              </a:r>
+              <a:r>
+                <a:rPr lang="en-US" dirty="0" smtClean="0"/>
+                <a:t> </a:t>
+              </a:r>
+              <a:r>
+                <a:rPr lang="en-US" dirty="0" err="1" smtClean="0"/>
+                <a:t>bij</a:t>
+              </a:r>
+              <a:r>
+                <a:rPr lang="en-US" dirty="0" smtClean="0"/>
+                <a:t> het </a:t>
+              </a:r>
+              <a:r>
+                <a:rPr lang="en-US" dirty="0" err="1" smtClean="0"/>
+                <a:t>toevoegen</a:t>
+              </a:r>
+              <a:r>
+                <a:rPr lang="en-US" dirty="0" smtClean="0"/>
+                <a:t> van </a:t>
+              </a:r>
+              <a:r>
+                <a:rPr lang="en-US" dirty="0" err="1" smtClean="0"/>
+                <a:t>constanten</a:t>
               </a:r>
               <a:endParaRPr lang="en-US" dirty="0"/>
             </a:p>
@@ -20844,7 +21019,7 @@
         </p:nvGrpSpPr>
         <p:grpSpPr>
           <a:xfrm>
-            <a:off x="380481" y="5160333"/>
+            <a:off x="389933" y="5301208"/>
             <a:ext cx="8353967" cy="620459"/>
             <a:chOff x="380481" y="5160333"/>
             <a:chExt cx="8353967" cy="620459"/>
@@ -20894,7 +21069,67 @@
               <a:pPr algn="ctr"/>
               <a:r>
                 <a:rPr lang="en-US" dirty="0" smtClean="0"/>
-                <a:t>Optimaliseren van de constanten</a:t>
+                <a:t>       Het </a:t>
+              </a:r>
+              <a:r>
+                <a:rPr lang="en-US" dirty="0" err="1" smtClean="0"/>
+                <a:t>vermijden</a:t>
+              </a:r>
+              <a:r>
+                <a:rPr lang="en-US" dirty="0"/>
+                <a:t> </a:t>
+              </a:r>
+              <a:r>
+                <a:rPr lang="en-US" dirty="0" smtClean="0"/>
+                <a:t>van </a:t>
+              </a:r>
+              <a:r>
+                <a:rPr lang="en-US" dirty="0" err="1" smtClean="0"/>
+                <a:t>redundante</a:t>
+              </a:r>
+              <a:r>
+                <a:rPr lang="en-US" dirty="0" smtClean="0"/>
+                <a:t> </a:t>
+              </a:r>
+              <a:r>
+                <a:rPr lang="en-US" dirty="0" err="1" smtClean="0"/>
+                <a:t>uitwerkingen</a:t>
+              </a:r>
+              <a:r>
+                <a:rPr lang="en-US" dirty="0" smtClean="0"/>
+                <a:t> </a:t>
+              </a:r>
+              <a:r>
+                <a:rPr lang="en-US" dirty="0" err="1" smtClean="0"/>
+                <a:t>heeft</a:t>
+              </a:r>
+              <a:r>
+                <a:rPr lang="en-US" dirty="0" smtClean="0"/>
+                <a:t> </a:t>
+              </a:r>
+              <a:r>
+                <a:rPr lang="en-US" dirty="0" err="1" smtClean="0"/>
+                <a:t>een</a:t>
+              </a:r>
+              <a:r>
+                <a:rPr lang="en-US" dirty="0" smtClean="0"/>
+                <a:t> </a:t>
+              </a:r>
+              <a:r>
+                <a:rPr lang="en-US" dirty="0" err="1" smtClean="0"/>
+                <a:t>invloed</a:t>
+              </a:r>
+              <a:r>
+                <a:rPr lang="en-US" dirty="0" smtClean="0"/>
+                <a:t> op de </a:t>
+              </a:r>
+              <a:r>
+                <a:rPr lang="en-US" dirty="0" err="1" smtClean="0"/>
+                <a:t>tijd</a:t>
+              </a:r>
+              <a:r>
+                <a:rPr lang="en-US" dirty="0" smtClean="0"/>
+                <a:t> </a:t>
               </a:r>
               <a:endParaRPr lang="en-US" dirty="0"/>
             </a:p>
@@ -22078,6 +22313,13 @@
   <p:clrMapOvr>
     <a:masterClrMapping/>
   </p:clrMapOvr>
+  <p:timing>
+    <p:tnLst>
+      <p:par>
+        <p:cTn xmlns:p14="http://schemas.microsoft.com/office/powerpoint/2010/main" id="1" dur="indefinite" restart="never" nodeType="tmRoot"/>
+      </p:par>
+    </p:tnLst>
+  </p:timing>
 </p:sld>
 </file>
 
@@ -22154,6 +22396,13 @@
   <p:clrMapOvr>
     <a:masterClrMapping/>
   </p:clrMapOvr>
+  <p:timing>
+    <p:tnLst>
+      <p:par>
+        <p:cTn xmlns:p14="http://schemas.microsoft.com/office/powerpoint/2010/main" id="1" dur="indefinite" restart="never" nodeType="tmRoot"/>
+      </p:par>
+    </p:tnLst>
+  </p:timing>
 </p:sld>
 </file>
 
@@ -22419,13 +22668,10 @@
           </a:p>
           <a:p>
             <a:r>
-              <a:rPr lang="nl-BE" dirty="0"/>
-              <a:t>Verder </a:t>
+              <a:rPr lang="nl-BE" dirty="0" smtClean="0"/>
+              <a:t>Toekomstig onderzoek</a:t>
             </a:r>
-            <a:r>
-              <a:rPr lang="nl-BE" dirty="0" smtClean="0"/>
-              <a:t>werk (NIP)</a:t>
-            </a:r>
+            <a:endParaRPr lang="nl-BE" dirty="0" smtClean="0"/>
           </a:p>
           <a:p>
             <a:r>
@@ -22519,6 +22765,291 @@
           <a:p>
             <a:r>
               <a:rPr lang="en-US" dirty="0" smtClean="0"/>
+              <a:t>Experiment </a:t>
+            </a:r>
+            <a:r>
+              <a:rPr lang="en-US" dirty="0" smtClean="0"/>
+              <a:t>3: </a:t>
+            </a:r>
+            <a:r>
+              <a:rPr lang="en-US" dirty="0" err="1" smtClean="0"/>
+              <a:t>Gewichten</a:t>
+            </a:r>
+            <a:r>
+              <a:rPr lang="en-US" dirty="0" smtClean="0"/>
+              <a:t> </a:t>
+            </a:r>
+            <a:r>
+              <a:rPr lang="en-US" dirty="0" err="1" smtClean="0"/>
+              <a:t>opl</a:t>
+            </a:r>
+            <a:r>
+              <a:rPr lang="en-US" dirty="0" smtClean="0"/>
+              <a:t>%</a:t>
+            </a:r>
+            <a:endParaRPr lang="en-US" dirty="0"/>
+          </a:p>
+        </p:txBody>
+      </p:sp>
+      <p:sp>
+        <p:nvSpPr>
+          <p:cNvPr id="3" name="Content Placeholder 2"/>
+          <p:cNvSpPr>
+            <a:spLocks noGrp="1"/>
+          </p:cNvSpPr>
+          <p:nvPr>
+            <p:ph idx="1"/>
+          </p:nvPr>
+        </p:nvSpPr>
+        <p:spPr/>
+        <p:txBody>
+          <a:bodyPr/>
+          <a:lstStyle/>
+          <a:p>
+            <a:endParaRPr lang="en-US"/>
+          </a:p>
+        </p:txBody>
+      </p:sp>
+    </p:spTree>
+    <p:extLst>
+      <p:ext uri="{BB962C8B-B14F-4D97-AF65-F5344CB8AC3E}">
+        <p14:creationId xmlns:p14="http://schemas.microsoft.com/office/powerpoint/2010/main" val="2335274681"/>
+      </p:ext>
+    </p:extLst>
+  </p:cSld>
+  <p:clrMapOvr>
+    <a:masterClrMapping/>
+  </p:clrMapOvr>
+  <p:timing>
+    <p:tnLst>
+      <p:par>
+        <p:cTn xmlns:p14="http://schemas.microsoft.com/office/powerpoint/2010/main" id="1" dur="indefinite" restart="never" nodeType="tmRoot"/>
+      </p:par>
+    </p:tnLst>
+  </p:timing>
+</p:sld>
+</file>
+
+<file path=ppt/slides/slide21.xml><?xml version="1.0" encoding="utf-8"?>
+<p:sld xmlns:a="http://schemas.openxmlformats.org/drawingml/2006/main" xmlns:r="http://schemas.openxmlformats.org/officeDocument/2006/relationships" xmlns:p="http://schemas.openxmlformats.org/presentationml/2006/main">
+  <p:cSld>
+    <p:spTree>
+      <p:nvGrpSpPr>
+        <p:cNvPr id="1" name=""/>
+        <p:cNvGrpSpPr/>
+        <p:nvPr/>
+      </p:nvGrpSpPr>
+      <p:grpSpPr>
+        <a:xfrm>
+          <a:off x="0" y="0"/>
+          <a:ext cx="0" cy="0"/>
+          <a:chOff x="0" y="0"/>
+          <a:chExt cx="0" cy="0"/>
+        </a:xfrm>
+      </p:grpSpPr>
+      <p:sp>
+        <p:nvSpPr>
+          <p:cNvPr id="2" name="Title 1"/>
+          <p:cNvSpPr>
+            <a:spLocks noGrp="1"/>
+          </p:cNvSpPr>
+          <p:nvPr>
+            <p:ph type="title"/>
+          </p:nvPr>
+        </p:nvSpPr>
+        <p:spPr/>
+        <p:txBody>
+          <a:bodyPr/>
+          <a:lstStyle/>
+          <a:p>
+            <a:r>
+              <a:rPr lang="en-US" dirty="0" smtClean="0"/>
+              <a:t>Experiment </a:t>
+            </a:r>
+            <a:r>
+              <a:rPr lang="en-US" dirty="0" smtClean="0"/>
+              <a:t>4: </a:t>
+            </a:r>
+            <a:r>
+              <a:rPr lang="en-US" dirty="0" err="1" smtClean="0"/>
+              <a:t>Gewichten</a:t>
+            </a:r>
+            <a:r>
+              <a:rPr lang="en-US" dirty="0" smtClean="0"/>
+              <a:t> </a:t>
+            </a:r>
+            <a:r>
+              <a:rPr lang="en-US" dirty="0" err="1" smtClean="0"/>
+              <a:t>tijd</a:t>
+            </a:r>
+            <a:endParaRPr lang="en-US" dirty="0"/>
+          </a:p>
+        </p:txBody>
+      </p:sp>
+      <p:sp>
+        <p:nvSpPr>
+          <p:cNvPr id="3" name="Content Placeholder 2"/>
+          <p:cNvSpPr>
+            <a:spLocks noGrp="1"/>
+          </p:cNvSpPr>
+          <p:nvPr>
+            <p:ph idx="1"/>
+          </p:nvPr>
+        </p:nvSpPr>
+        <p:spPr/>
+        <p:txBody>
+          <a:bodyPr/>
+          <a:lstStyle/>
+          <a:p>
+            <a:endParaRPr lang="en-US"/>
+          </a:p>
+        </p:txBody>
+      </p:sp>
+    </p:spTree>
+    <p:extLst>
+      <p:ext uri="{BB962C8B-B14F-4D97-AF65-F5344CB8AC3E}">
+        <p14:creationId xmlns:p14="http://schemas.microsoft.com/office/powerpoint/2010/main" val="2335274681"/>
+      </p:ext>
+    </p:extLst>
+  </p:cSld>
+  <p:clrMapOvr>
+    <a:masterClrMapping/>
+  </p:clrMapOvr>
+  <p:timing>
+    <p:tnLst>
+      <p:par>
+        <p:cTn xmlns:p14="http://schemas.microsoft.com/office/powerpoint/2010/main" id="1" dur="indefinite" restart="never" nodeType="tmRoot"/>
+      </p:par>
+    </p:tnLst>
+  </p:timing>
+</p:sld>
+</file>
+
+<file path=ppt/slides/slide22.xml><?xml version="1.0" encoding="utf-8"?>
+<p:sld xmlns:a="http://schemas.openxmlformats.org/drawingml/2006/main" xmlns:r="http://schemas.openxmlformats.org/officeDocument/2006/relationships" xmlns:p="http://schemas.openxmlformats.org/presentationml/2006/main">
+  <p:cSld>
+    <p:spTree>
+      <p:nvGrpSpPr>
+        <p:cNvPr id="1" name=""/>
+        <p:cNvGrpSpPr/>
+        <p:nvPr/>
+      </p:nvGrpSpPr>
+      <p:grpSpPr>
+        <a:xfrm>
+          <a:off x="0" y="0"/>
+          <a:ext cx="0" cy="0"/>
+          <a:chOff x="0" y="0"/>
+          <a:chExt cx="0" cy="0"/>
+        </a:xfrm>
+      </p:grpSpPr>
+      <p:sp>
+        <p:nvSpPr>
+          <p:cNvPr id="2" name="Title 1"/>
+          <p:cNvSpPr>
+            <a:spLocks noGrp="1"/>
+          </p:cNvSpPr>
+          <p:nvPr>
+            <p:ph type="title"/>
+          </p:nvPr>
+        </p:nvSpPr>
+        <p:spPr/>
+        <p:txBody>
+          <a:bodyPr/>
+          <a:lstStyle/>
+          <a:p>
+            <a:r>
+              <a:rPr lang="en-US" dirty="0" smtClean="0"/>
+              <a:t>Experiment </a:t>
+            </a:r>
+            <a:r>
+              <a:rPr lang="en-US" dirty="0" smtClean="0"/>
+              <a:t>5: Brute force </a:t>
+            </a:r>
+            <a:r>
+              <a:rPr lang="en-US" dirty="0" err="1" smtClean="0"/>
+              <a:t>vs</a:t>
+            </a:r>
+            <a:r>
+              <a:rPr lang="en-US" dirty="0" smtClean="0"/>
+              <a:t> Opt</a:t>
+            </a:r>
+            <a:endParaRPr lang="en-US" dirty="0"/>
+          </a:p>
+        </p:txBody>
+      </p:sp>
+      <p:sp>
+        <p:nvSpPr>
+          <p:cNvPr id="3" name="Content Placeholder 2"/>
+          <p:cNvSpPr>
+            <a:spLocks noGrp="1"/>
+          </p:cNvSpPr>
+          <p:nvPr>
+            <p:ph idx="1"/>
+          </p:nvPr>
+        </p:nvSpPr>
+        <p:spPr/>
+        <p:txBody>
+          <a:bodyPr/>
+          <a:lstStyle/>
+          <a:p>
+            <a:endParaRPr lang="en-US"/>
+          </a:p>
+        </p:txBody>
+      </p:sp>
+    </p:spTree>
+    <p:extLst>
+      <p:ext uri="{BB962C8B-B14F-4D97-AF65-F5344CB8AC3E}">
+        <p14:creationId xmlns:p14="http://schemas.microsoft.com/office/powerpoint/2010/main" val="2335274681"/>
+      </p:ext>
+    </p:extLst>
+  </p:cSld>
+  <p:clrMapOvr>
+    <a:masterClrMapping/>
+  </p:clrMapOvr>
+  <p:timing>
+    <p:tnLst>
+      <p:par>
+        <p:cTn xmlns:p14="http://schemas.microsoft.com/office/powerpoint/2010/main" id="1" dur="indefinite" restart="never" nodeType="tmRoot"/>
+      </p:par>
+    </p:tnLst>
+  </p:timing>
+</p:sld>
+</file>
+
+<file path=ppt/slides/slide23.xml><?xml version="1.0" encoding="utf-8"?>
+<p:sld xmlns:a="http://schemas.openxmlformats.org/drawingml/2006/main" xmlns:r="http://schemas.openxmlformats.org/officeDocument/2006/relationships" xmlns:p="http://schemas.openxmlformats.org/presentationml/2006/main">
+  <p:cSld>
+    <p:spTree>
+      <p:nvGrpSpPr>
+        <p:cNvPr id="1" name=""/>
+        <p:cNvGrpSpPr/>
+        <p:nvPr/>
+      </p:nvGrpSpPr>
+      <p:grpSpPr>
+        <a:xfrm>
+          <a:off x="0" y="0"/>
+          <a:ext cx="0" cy="0"/>
+          <a:chOff x="0" y="0"/>
+          <a:chExt cx="0" cy="0"/>
+        </a:xfrm>
+      </p:grpSpPr>
+      <p:sp>
+        <p:nvSpPr>
+          <p:cNvPr id="2" name="Title 1"/>
+          <p:cNvSpPr>
+            <a:spLocks noGrp="1"/>
+          </p:cNvSpPr>
+          <p:nvPr>
+            <p:ph type="title"/>
+          </p:nvPr>
+        </p:nvSpPr>
+        <p:spPr/>
+        <p:txBody>
+          <a:bodyPr/>
+          <a:lstStyle/>
+          <a:p>
+            <a:r>
+              <a:rPr lang="en-US" dirty="0" err="1" smtClean="0"/>
               <a:t>Succescriteria</a:t>
             </a:r>
             <a:endParaRPr lang="en-US" dirty="0"/>
@@ -22892,278 +23423,6 @@
 </p:sld>
 </file>
 
-<file path=ppt/slides/slide21.xml><?xml version="1.0" encoding="utf-8"?>
-<p:sld xmlns:a="http://schemas.openxmlformats.org/drawingml/2006/main" xmlns:r="http://schemas.openxmlformats.org/officeDocument/2006/relationships" xmlns:p="http://schemas.openxmlformats.org/presentationml/2006/main">
-  <p:cSld>
-    <p:spTree>
-      <p:nvGrpSpPr>
-        <p:cNvPr id="1" name=""/>
-        <p:cNvGrpSpPr/>
-        <p:nvPr/>
-      </p:nvGrpSpPr>
-      <p:grpSpPr>
-        <a:xfrm>
-          <a:off x="0" y="0"/>
-          <a:ext cx="0" cy="0"/>
-          <a:chOff x="0" y="0"/>
-          <a:chExt cx="0" cy="0"/>
-        </a:xfrm>
-      </p:grpSpPr>
-      <p:sp>
-        <p:nvSpPr>
-          <p:cNvPr id="2" name="Title 1"/>
-          <p:cNvSpPr>
-            <a:spLocks noGrp="1"/>
-          </p:cNvSpPr>
-          <p:nvPr>
-            <p:ph type="ctrTitle"/>
-          </p:nvPr>
-        </p:nvSpPr>
-        <p:spPr/>
-        <p:txBody>
-          <a:bodyPr/>
-          <a:lstStyle/>
-          <a:p>
-            <a:r>
-              <a:rPr lang="en-US" dirty="0" smtClean="0"/>
-              <a:t>Conclusie</a:t>
-            </a:r>
-            <a:endParaRPr lang="en-US" dirty="0"/>
-          </a:p>
-        </p:txBody>
-      </p:sp>
-      <p:sp>
-        <p:nvSpPr>
-          <p:cNvPr id="3" name="Subtitle 2"/>
-          <p:cNvSpPr>
-            <a:spLocks noGrp="1"/>
-          </p:cNvSpPr>
-          <p:nvPr>
-            <p:ph type="subTitle" idx="1"/>
-          </p:nvPr>
-        </p:nvSpPr>
-        <p:spPr/>
-        <p:txBody>
-          <a:bodyPr/>
-          <a:lstStyle/>
-          <a:p>
-            <a:endParaRPr lang="en-US" dirty="0"/>
-          </a:p>
-        </p:txBody>
-      </p:sp>
-    </p:spTree>
-    <p:extLst>
-      <p:ext uri="{BB962C8B-B14F-4D97-AF65-F5344CB8AC3E}">
-        <p14:creationId xmlns:p14="http://schemas.microsoft.com/office/powerpoint/2010/main" val="2579041775"/>
-      </p:ext>
-    </p:extLst>
-  </p:cSld>
-  <p:clrMapOvr>
-    <a:masterClrMapping/>
-  </p:clrMapOvr>
-  <p:timing>
-    <p:tnLst>
-      <p:par>
-        <p:cTn xmlns:p14="http://schemas.microsoft.com/office/powerpoint/2010/main" id="1" dur="indefinite" restart="never" nodeType="tmRoot"/>
-      </p:par>
-    </p:tnLst>
-  </p:timing>
-</p:sld>
-</file>
-
-<file path=ppt/slides/slide22.xml><?xml version="1.0" encoding="utf-8"?>
-<p:sld xmlns:a="http://schemas.openxmlformats.org/drawingml/2006/main" xmlns:r="http://schemas.openxmlformats.org/officeDocument/2006/relationships" xmlns:p="http://schemas.openxmlformats.org/presentationml/2006/main">
-  <p:cSld>
-    <p:spTree>
-      <p:nvGrpSpPr>
-        <p:cNvPr id="1" name=""/>
-        <p:cNvGrpSpPr/>
-        <p:nvPr/>
-      </p:nvGrpSpPr>
-      <p:grpSpPr>
-        <a:xfrm>
-          <a:off x="0" y="0"/>
-          <a:ext cx="0" cy="0"/>
-          <a:chOff x="0" y="0"/>
-          <a:chExt cx="0" cy="0"/>
-        </a:xfrm>
-      </p:grpSpPr>
-      <p:sp>
-        <p:nvSpPr>
-          <p:cNvPr id="2" name="Title 1"/>
-          <p:cNvSpPr>
-            <a:spLocks noGrp="1"/>
-          </p:cNvSpPr>
-          <p:nvPr>
-            <p:ph type="ctrTitle"/>
-          </p:nvPr>
-        </p:nvSpPr>
-        <p:spPr/>
-        <p:txBody>
-          <a:bodyPr/>
-          <a:lstStyle/>
-          <a:p>
-            <a:r>
-              <a:rPr lang="en-US" dirty="0" smtClean="0"/>
-              <a:t>Toekomstig </a:t>
-            </a:r>
-            <a:br>
-              <a:rPr lang="en-US" dirty="0" smtClean="0"/>
-            </a:br>
-            <a:r>
-              <a:rPr lang="en-US" dirty="0" smtClean="0"/>
-              <a:t>onderzoek</a:t>
-            </a:r>
-            <a:endParaRPr lang="en-US" dirty="0"/>
-          </a:p>
-        </p:txBody>
-      </p:sp>
-      <p:sp>
-        <p:nvSpPr>
-          <p:cNvPr id="3" name="Subtitle 2"/>
-          <p:cNvSpPr>
-            <a:spLocks noGrp="1"/>
-          </p:cNvSpPr>
-          <p:nvPr>
-            <p:ph type="subTitle" idx="1"/>
-          </p:nvPr>
-        </p:nvSpPr>
-        <p:spPr/>
-        <p:txBody>
-          <a:bodyPr/>
-          <a:lstStyle/>
-          <a:p>
-            <a:r>
-              <a:rPr lang="en-US" dirty="0" smtClean="0"/>
-              <a:t>Mogelijkheden tot verder onderzoek binnen het onderzoeksdomein</a:t>
-            </a:r>
-            <a:endParaRPr lang="en-US" dirty="0"/>
-          </a:p>
-        </p:txBody>
-      </p:sp>
-    </p:spTree>
-    <p:extLst>
-      <p:ext uri="{BB962C8B-B14F-4D97-AF65-F5344CB8AC3E}">
-        <p14:creationId xmlns:p14="http://schemas.microsoft.com/office/powerpoint/2010/main" val="2579041775"/>
-      </p:ext>
-    </p:extLst>
-  </p:cSld>
-  <p:clrMapOvr>
-    <a:masterClrMapping/>
-  </p:clrMapOvr>
-  <p:timing>
-    <p:tnLst>
-      <p:par>
-        <p:cTn xmlns:p14="http://schemas.microsoft.com/office/powerpoint/2010/main" id="1" dur="indefinite" restart="never" nodeType="tmRoot"/>
-      </p:par>
-    </p:tnLst>
-  </p:timing>
-</p:sld>
-</file>
-
-<file path=ppt/slides/slide23.xml><?xml version="1.0" encoding="utf-8"?>
-<p:sld xmlns:a="http://schemas.openxmlformats.org/drawingml/2006/main" xmlns:r="http://schemas.openxmlformats.org/officeDocument/2006/relationships" xmlns:p="http://schemas.openxmlformats.org/presentationml/2006/main">
-  <p:cSld>
-    <p:spTree>
-      <p:nvGrpSpPr>
-        <p:cNvPr id="1" name=""/>
-        <p:cNvGrpSpPr/>
-        <p:nvPr/>
-      </p:nvGrpSpPr>
-      <p:grpSpPr>
-        <a:xfrm>
-          <a:off x="0" y="0"/>
-          <a:ext cx="0" cy="0"/>
-          <a:chOff x="0" y="0"/>
-          <a:chExt cx="0" cy="0"/>
-        </a:xfrm>
-      </p:grpSpPr>
-      <p:sp>
-        <p:nvSpPr>
-          <p:cNvPr id="2" name="Title 1"/>
-          <p:cNvSpPr>
-            <a:spLocks noGrp="1"/>
-          </p:cNvSpPr>
-          <p:nvPr>
-            <p:ph type="title"/>
-          </p:nvPr>
-        </p:nvSpPr>
-        <p:spPr/>
-        <p:txBody>
-          <a:bodyPr/>
-          <a:lstStyle/>
-          <a:p>
-            <a:r>
-              <a:rPr lang="en-US" dirty="0" smtClean="0"/>
-              <a:t>Toekomstig onderzoek</a:t>
-            </a:r>
-            <a:endParaRPr lang="en-US" dirty="0"/>
-          </a:p>
-        </p:txBody>
-      </p:sp>
-      <p:sp>
-        <p:nvSpPr>
-          <p:cNvPr id="3" name="Content Placeholder 2"/>
-          <p:cNvSpPr>
-            <a:spLocks noGrp="1"/>
-          </p:cNvSpPr>
-          <p:nvPr>
-            <p:ph idx="1"/>
-          </p:nvPr>
-        </p:nvSpPr>
-        <p:spPr/>
-        <p:txBody>
-          <a:bodyPr/>
-          <a:lstStyle/>
-          <a:p>
-            <a:r>
-              <a:rPr lang="en-US" dirty="0" smtClean="0"/>
-              <a:t>Zoeken naar een geschikte heuristiek</a:t>
-            </a:r>
-          </a:p>
-          <a:p>
-            <a:r>
-              <a:rPr lang="en-US" dirty="0" smtClean="0"/>
-              <a:t>De implementatie van haakjes</a:t>
-            </a:r>
-          </a:p>
-          <a:p>
-            <a:r>
-              <a:rPr lang="en-US" dirty="0" smtClean="0"/>
-              <a:t>Verdere optimalisaties in het opstellen van de bewerkingsboom</a:t>
-            </a:r>
-          </a:p>
-          <a:p>
-            <a:endParaRPr lang="en-US" dirty="0" smtClean="0"/>
-          </a:p>
-          <a:p>
-            <a:endParaRPr lang="en-US" dirty="0"/>
-          </a:p>
-          <a:p>
-            <a:endParaRPr lang="en-US" dirty="0"/>
-          </a:p>
-        </p:txBody>
-      </p:sp>
-    </p:spTree>
-    <p:extLst>
-      <p:ext uri="{BB962C8B-B14F-4D97-AF65-F5344CB8AC3E}">
-        <p14:creationId xmlns:p14="http://schemas.microsoft.com/office/powerpoint/2010/main" val="972025637"/>
-      </p:ext>
-    </p:extLst>
-  </p:cSld>
-  <p:clrMapOvr>
-    <a:masterClrMapping/>
-  </p:clrMapOvr>
-  <p:timing>
-    <p:tnLst>
-      <p:par>
-        <p:cTn xmlns:p14="http://schemas.microsoft.com/office/powerpoint/2010/main" id="1" dur="indefinite" restart="never" nodeType="tmRoot"/>
-      </p:par>
-    </p:tnLst>
-  </p:timing>
-</p:sld>
-</file>
-
 <file path=ppt/slides/slide24.xml><?xml version="1.0" encoding="utf-8"?>
 <p:sld xmlns:a="http://schemas.openxmlformats.org/drawingml/2006/main" xmlns:r="http://schemas.openxmlformats.org/officeDocument/2006/relationships" xmlns:p="http://schemas.openxmlformats.org/presentationml/2006/main">
   <p:cSld>
@@ -23198,7 +23457,7 @@
           <a:p>
             <a:r>
               <a:rPr lang="en-US" dirty="0" smtClean="0"/>
-              <a:t>Demo</a:t>
+              <a:t>Conclusie</a:t>
             </a:r>
             <a:endParaRPr lang="en-US" dirty="0"/>
           </a:p>
@@ -23219,17 +23478,6 @@
           <a:bodyPr/>
           <a:lstStyle/>
           <a:p>
-            <a:r>
-              <a:rPr lang="en-US" dirty="0" smtClean="0"/>
-              <a:t>Een korte demonstratie </a:t>
-            </a:r>
-            <a:br>
-              <a:rPr lang="en-US" dirty="0" smtClean="0"/>
-            </a:br>
-            <a:r>
-              <a:rPr lang="en-US" dirty="0" smtClean="0"/>
-              <a:t>van de applicatie</a:t>
-            </a:r>
             <a:endParaRPr lang="en-US" dirty="0"/>
           </a:p>
         </p:txBody>
@@ -23237,7 +23485,7 @@
     </p:spTree>
     <p:extLst>
       <p:ext uri="{BB962C8B-B14F-4D97-AF65-F5344CB8AC3E}">
-        <p14:creationId xmlns:p14="http://schemas.microsoft.com/office/powerpoint/2010/main" val="3184497847"/>
+        <p14:creationId xmlns:p14="http://schemas.microsoft.com/office/powerpoint/2010/main" val="2579041775"/>
       </p:ext>
     </p:extLst>
   </p:cSld>
@@ -23287,6 +23535,457 @@
           <a:lstStyle/>
           <a:p>
             <a:r>
+              <a:rPr lang="en-US" dirty="0" err="1" smtClean="0"/>
+              <a:t>Conclusie</a:t>
+            </a:r>
+            <a:endParaRPr lang="en-US" dirty="0"/>
+          </a:p>
+        </p:txBody>
+      </p:sp>
+      <p:sp>
+        <p:nvSpPr>
+          <p:cNvPr id="3" name="Content Placeholder 2"/>
+          <p:cNvSpPr>
+            <a:spLocks noGrp="1"/>
+          </p:cNvSpPr>
+          <p:nvPr>
+            <p:ph idx="1"/>
+          </p:nvPr>
+        </p:nvSpPr>
+        <p:spPr/>
+        <p:txBody>
+          <a:bodyPr/>
+          <a:lstStyle/>
+          <a:p>
+            <a:r>
+              <a:rPr lang="en-US" dirty="0" err="1" smtClean="0"/>
+              <a:t>Veel</a:t>
+            </a:r>
+            <a:r>
+              <a:rPr lang="en-US" dirty="0" smtClean="0"/>
+              <a:t> </a:t>
+            </a:r>
+            <a:r>
+              <a:rPr lang="en-US" dirty="0" err="1" smtClean="0"/>
+              <a:t>sneller</a:t>
+            </a:r>
+            <a:r>
+              <a:rPr lang="en-US" dirty="0" smtClean="0"/>
+              <a:t> </a:t>
+            </a:r>
+            <a:r>
+              <a:rPr lang="en-US" dirty="0" err="1" smtClean="0"/>
+              <a:t>dan</a:t>
+            </a:r>
+            <a:r>
+              <a:rPr lang="en-US" dirty="0" smtClean="0"/>
+              <a:t> de brute force </a:t>
+            </a:r>
+            <a:r>
+              <a:rPr lang="en-US" dirty="0" err="1" smtClean="0"/>
+              <a:t>aanpak</a:t>
+            </a:r>
+            <a:endParaRPr lang="en-US" dirty="0" smtClean="0"/>
+          </a:p>
+          <a:p>
+            <a:r>
+              <a:rPr lang="en-US" dirty="0" err="1" smtClean="0"/>
+              <a:t>Geen</a:t>
+            </a:r>
+            <a:r>
+              <a:rPr lang="en-US" dirty="0" smtClean="0"/>
+              <a:t> 100% </a:t>
+            </a:r>
+            <a:r>
+              <a:rPr lang="en-US" dirty="0" err="1" smtClean="0"/>
+              <a:t>oplossingsgraad</a:t>
+            </a:r>
+            <a:endParaRPr lang="en-US" dirty="0" smtClean="0"/>
+          </a:p>
+          <a:p>
+            <a:r>
+              <a:rPr lang="en-US" dirty="0" err="1" smtClean="0"/>
+              <a:t>Experimenten</a:t>
+            </a:r>
+            <a:r>
+              <a:rPr lang="en-US" dirty="0" smtClean="0"/>
+              <a:t> </a:t>
+            </a:r>
+            <a:r>
+              <a:rPr lang="en-US" dirty="0" err="1" smtClean="0"/>
+              <a:t>afhankelijk</a:t>
+            </a:r>
+            <a:r>
+              <a:rPr lang="en-US" dirty="0" smtClean="0"/>
+              <a:t> van de </a:t>
+            </a:r>
+            <a:r>
+              <a:rPr lang="en-US" dirty="0" err="1" smtClean="0"/>
+              <a:t>randomgenerator</a:t>
+            </a:r>
+            <a:endParaRPr lang="en-US" dirty="0" smtClean="0"/>
+          </a:p>
+          <a:p>
+            <a:r>
+              <a:rPr lang="en-US" dirty="0" err="1" smtClean="0"/>
+              <a:t>Beperkte</a:t>
+            </a:r>
+            <a:r>
+              <a:rPr lang="en-US" dirty="0" smtClean="0"/>
+              <a:t> </a:t>
+            </a:r>
+            <a:r>
+              <a:rPr lang="en-US" dirty="0" err="1" smtClean="0"/>
+              <a:t>diepte</a:t>
+            </a:r>
+            <a:endParaRPr lang="en-US" dirty="0" smtClean="0"/>
+          </a:p>
+          <a:p>
+            <a:r>
+              <a:rPr lang="en-US" dirty="0" err="1" smtClean="0"/>
+              <a:t>Geen</a:t>
+            </a:r>
+            <a:r>
+              <a:rPr lang="en-US" dirty="0" smtClean="0"/>
+              <a:t> </a:t>
+            </a:r>
+            <a:r>
+              <a:rPr lang="en-US" dirty="0" err="1" smtClean="0"/>
+              <a:t>heuristiek</a:t>
+            </a:r>
+            <a:endParaRPr lang="en-US" dirty="0" smtClean="0"/>
+          </a:p>
+        </p:txBody>
+      </p:sp>
+    </p:spTree>
+    <p:extLst>
+      <p:ext uri="{BB962C8B-B14F-4D97-AF65-F5344CB8AC3E}">
+        <p14:creationId xmlns:p14="http://schemas.microsoft.com/office/powerpoint/2010/main" val="3138711606"/>
+      </p:ext>
+    </p:extLst>
+  </p:cSld>
+  <p:clrMapOvr>
+    <a:masterClrMapping/>
+  </p:clrMapOvr>
+</p:sld>
+</file>
+
+<file path=ppt/slides/slide26.xml><?xml version="1.0" encoding="utf-8"?>
+<p:sld xmlns:a="http://schemas.openxmlformats.org/drawingml/2006/main" xmlns:r="http://schemas.openxmlformats.org/officeDocument/2006/relationships" xmlns:p="http://schemas.openxmlformats.org/presentationml/2006/main">
+  <p:cSld>
+    <p:spTree>
+      <p:nvGrpSpPr>
+        <p:cNvPr id="1" name=""/>
+        <p:cNvGrpSpPr/>
+        <p:nvPr/>
+      </p:nvGrpSpPr>
+      <p:grpSpPr>
+        <a:xfrm>
+          <a:off x="0" y="0"/>
+          <a:ext cx="0" cy="0"/>
+          <a:chOff x="0" y="0"/>
+          <a:chExt cx="0" cy="0"/>
+        </a:xfrm>
+      </p:grpSpPr>
+      <p:sp>
+        <p:nvSpPr>
+          <p:cNvPr id="2" name="Title 1"/>
+          <p:cNvSpPr>
+            <a:spLocks noGrp="1"/>
+          </p:cNvSpPr>
+          <p:nvPr>
+            <p:ph type="ctrTitle"/>
+          </p:nvPr>
+        </p:nvSpPr>
+        <p:spPr/>
+        <p:txBody>
+          <a:bodyPr/>
+          <a:lstStyle/>
+          <a:p>
+            <a:r>
+              <a:rPr lang="en-US" dirty="0" smtClean="0"/>
+              <a:t>Toekomstig </a:t>
+            </a:r>
+            <a:br>
+              <a:rPr lang="en-US" dirty="0" smtClean="0"/>
+            </a:br>
+            <a:r>
+              <a:rPr lang="en-US" dirty="0" smtClean="0"/>
+              <a:t>onderzoek</a:t>
+            </a:r>
+            <a:endParaRPr lang="en-US" dirty="0"/>
+          </a:p>
+        </p:txBody>
+      </p:sp>
+      <p:sp>
+        <p:nvSpPr>
+          <p:cNvPr id="3" name="Subtitle 2"/>
+          <p:cNvSpPr>
+            <a:spLocks noGrp="1"/>
+          </p:cNvSpPr>
+          <p:nvPr>
+            <p:ph type="subTitle" idx="1"/>
+          </p:nvPr>
+        </p:nvSpPr>
+        <p:spPr/>
+        <p:txBody>
+          <a:bodyPr/>
+          <a:lstStyle/>
+          <a:p>
+            <a:r>
+              <a:rPr lang="en-US" dirty="0" smtClean="0"/>
+              <a:t>Mogelijkheden tot verder onderzoek binnen het onderzoeksdomein</a:t>
+            </a:r>
+            <a:endParaRPr lang="en-US" dirty="0"/>
+          </a:p>
+        </p:txBody>
+      </p:sp>
+    </p:spTree>
+    <p:extLst>
+      <p:ext uri="{BB962C8B-B14F-4D97-AF65-F5344CB8AC3E}">
+        <p14:creationId xmlns:p14="http://schemas.microsoft.com/office/powerpoint/2010/main" val="2579041775"/>
+      </p:ext>
+    </p:extLst>
+  </p:cSld>
+  <p:clrMapOvr>
+    <a:masterClrMapping/>
+  </p:clrMapOvr>
+  <p:timing>
+    <p:tnLst>
+      <p:par>
+        <p:cTn xmlns:p14="http://schemas.microsoft.com/office/powerpoint/2010/main" id="1" dur="indefinite" restart="never" nodeType="tmRoot"/>
+      </p:par>
+    </p:tnLst>
+  </p:timing>
+</p:sld>
+</file>
+
+<file path=ppt/slides/slide27.xml><?xml version="1.0" encoding="utf-8"?>
+<p:sld xmlns:a="http://schemas.openxmlformats.org/drawingml/2006/main" xmlns:r="http://schemas.openxmlformats.org/officeDocument/2006/relationships" xmlns:p="http://schemas.openxmlformats.org/presentationml/2006/main">
+  <p:cSld>
+    <p:spTree>
+      <p:nvGrpSpPr>
+        <p:cNvPr id="1" name=""/>
+        <p:cNvGrpSpPr/>
+        <p:nvPr/>
+      </p:nvGrpSpPr>
+      <p:grpSpPr>
+        <a:xfrm>
+          <a:off x="0" y="0"/>
+          <a:ext cx="0" cy="0"/>
+          <a:chOff x="0" y="0"/>
+          <a:chExt cx="0" cy="0"/>
+        </a:xfrm>
+      </p:grpSpPr>
+      <p:sp>
+        <p:nvSpPr>
+          <p:cNvPr id="2" name="Title 1"/>
+          <p:cNvSpPr>
+            <a:spLocks noGrp="1"/>
+          </p:cNvSpPr>
+          <p:nvPr>
+            <p:ph type="title"/>
+          </p:nvPr>
+        </p:nvSpPr>
+        <p:spPr/>
+        <p:txBody>
+          <a:bodyPr/>
+          <a:lstStyle/>
+          <a:p>
+            <a:r>
+              <a:rPr lang="en-US" dirty="0" smtClean="0"/>
+              <a:t>Toekomstig onderzoek</a:t>
+            </a:r>
+            <a:endParaRPr lang="en-US" dirty="0"/>
+          </a:p>
+        </p:txBody>
+      </p:sp>
+      <p:sp>
+        <p:nvSpPr>
+          <p:cNvPr id="3" name="Content Placeholder 2"/>
+          <p:cNvSpPr>
+            <a:spLocks noGrp="1"/>
+          </p:cNvSpPr>
+          <p:nvPr>
+            <p:ph idx="1"/>
+          </p:nvPr>
+        </p:nvSpPr>
+        <p:spPr/>
+        <p:txBody>
+          <a:bodyPr/>
+          <a:lstStyle/>
+          <a:p>
+            <a:r>
+              <a:rPr lang="en-US" dirty="0" smtClean="0"/>
+              <a:t>Zoeken naar een geschikte heuristiek</a:t>
+            </a:r>
+          </a:p>
+          <a:p>
+            <a:r>
+              <a:rPr lang="en-US" dirty="0" smtClean="0"/>
+              <a:t>De implementatie van haakjes</a:t>
+            </a:r>
+          </a:p>
+          <a:p>
+            <a:r>
+              <a:rPr lang="en-US" dirty="0" smtClean="0"/>
+              <a:t>Verdere optimalisaties in het opstellen van de bewerkingsboom</a:t>
+            </a:r>
+          </a:p>
+          <a:p>
+            <a:endParaRPr lang="en-US" dirty="0" smtClean="0"/>
+          </a:p>
+          <a:p>
+            <a:endParaRPr lang="en-US" dirty="0"/>
+          </a:p>
+          <a:p>
+            <a:endParaRPr lang="en-US" dirty="0"/>
+          </a:p>
+        </p:txBody>
+      </p:sp>
+    </p:spTree>
+    <p:extLst>
+      <p:ext uri="{BB962C8B-B14F-4D97-AF65-F5344CB8AC3E}">
+        <p14:creationId xmlns:p14="http://schemas.microsoft.com/office/powerpoint/2010/main" val="972025637"/>
+      </p:ext>
+    </p:extLst>
+  </p:cSld>
+  <p:clrMapOvr>
+    <a:masterClrMapping/>
+  </p:clrMapOvr>
+  <p:timing>
+    <p:tnLst>
+      <p:par>
+        <p:cTn xmlns:p14="http://schemas.microsoft.com/office/powerpoint/2010/main" id="1" dur="indefinite" restart="never" nodeType="tmRoot"/>
+      </p:par>
+    </p:tnLst>
+  </p:timing>
+</p:sld>
+</file>
+
+<file path=ppt/slides/slide28.xml><?xml version="1.0" encoding="utf-8"?>
+<p:sld xmlns:a="http://schemas.openxmlformats.org/drawingml/2006/main" xmlns:r="http://schemas.openxmlformats.org/officeDocument/2006/relationships" xmlns:p="http://schemas.openxmlformats.org/presentationml/2006/main">
+  <p:cSld>
+    <p:spTree>
+      <p:nvGrpSpPr>
+        <p:cNvPr id="1" name=""/>
+        <p:cNvGrpSpPr/>
+        <p:nvPr/>
+      </p:nvGrpSpPr>
+      <p:grpSpPr>
+        <a:xfrm>
+          <a:off x="0" y="0"/>
+          <a:ext cx="0" cy="0"/>
+          <a:chOff x="0" y="0"/>
+          <a:chExt cx="0" cy="0"/>
+        </a:xfrm>
+      </p:grpSpPr>
+      <p:sp>
+        <p:nvSpPr>
+          <p:cNvPr id="2" name="Title 1"/>
+          <p:cNvSpPr>
+            <a:spLocks noGrp="1"/>
+          </p:cNvSpPr>
+          <p:nvPr>
+            <p:ph type="ctrTitle"/>
+          </p:nvPr>
+        </p:nvSpPr>
+        <p:spPr/>
+        <p:txBody>
+          <a:bodyPr/>
+          <a:lstStyle/>
+          <a:p>
+            <a:r>
+              <a:rPr lang="en-US" dirty="0" smtClean="0"/>
+              <a:t>Demo</a:t>
+            </a:r>
+            <a:endParaRPr lang="en-US" dirty="0"/>
+          </a:p>
+        </p:txBody>
+      </p:sp>
+      <p:sp>
+        <p:nvSpPr>
+          <p:cNvPr id="3" name="Subtitle 2"/>
+          <p:cNvSpPr>
+            <a:spLocks noGrp="1"/>
+          </p:cNvSpPr>
+          <p:nvPr>
+            <p:ph type="subTitle" idx="1"/>
+          </p:nvPr>
+        </p:nvSpPr>
+        <p:spPr/>
+        <p:txBody>
+          <a:bodyPr/>
+          <a:lstStyle/>
+          <a:p>
+            <a:r>
+              <a:rPr lang="en-US" dirty="0" smtClean="0"/>
+              <a:t>Een korte demonstratie </a:t>
+            </a:r>
+            <a:br>
+              <a:rPr lang="en-US" dirty="0" smtClean="0"/>
+            </a:br>
+            <a:r>
+              <a:rPr lang="en-US" dirty="0" smtClean="0"/>
+              <a:t>van de applicatie</a:t>
+            </a:r>
+            <a:endParaRPr lang="en-US" dirty="0"/>
+          </a:p>
+        </p:txBody>
+      </p:sp>
+    </p:spTree>
+    <p:extLst>
+      <p:ext uri="{BB962C8B-B14F-4D97-AF65-F5344CB8AC3E}">
+        <p14:creationId xmlns:p14="http://schemas.microsoft.com/office/powerpoint/2010/main" val="3184497847"/>
+      </p:ext>
+    </p:extLst>
+  </p:cSld>
+  <p:clrMapOvr>
+    <a:masterClrMapping/>
+  </p:clrMapOvr>
+  <p:timing>
+    <p:tnLst>
+      <p:par>
+        <p:cTn xmlns:p14="http://schemas.microsoft.com/office/powerpoint/2010/main" id="1" dur="indefinite" restart="never" nodeType="tmRoot"/>
+      </p:par>
+    </p:tnLst>
+  </p:timing>
+</p:sld>
+</file>
+
+<file path=ppt/slides/slide29.xml><?xml version="1.0" encoding="utf-8"?>
+<p:sld xmlns:a="http://schemas.openxmlformats.org/drawingml/2006/main" xmlns:r="http://schemas.openxmlformats.org/officeDocument/2006/relationships" xmlns:p="http://schemas.openxmlformats.org/presentationml/2006/main">
+  <p:cSld>
+    <p:spTree>
+      <p:nvGrpSpPr>
+        <p:cNvPr id="1" name=""/>
+        <p:cNvGrpSpPr/>
+        <p:nvPr/>
+      </p:nvGrpSpPr>
+      <p:grpSpPr>
+        <a:xfrm>
+          <a:off x="0" y="0"/>
+          <a:ext cx="0" cy="0"/>
+          <a:chOff x="0" y="0"/>
+          <a:chExt cx="0" cy="0"/>
+        </a:xfrm>
+      </p:grpSpPr>
+      <p:sp>
+        <p:nvSpPr>
+          <p:cNvPr id="2" name="Title 1"/>
+          <p:cNvSpPr>
+            <a:spLocks noGrp="1"/>
+          </p:cNvSpPr>
+          <p:nvPr>
+            <p:ph type="title"/>
+          </p:nvPr>
+        </p:nvSpPr>
+        <p:spPr/>
+        <p:txBody>
+          <a:bodyPr/>
+          <a:lstStyle/>
+          <a:p>
+            <a:r>
               <a:rPr lang="en-US" dirty="0" smtClean="0"/>
               <a:t>Demonstratie</a:t>
             </a:r>
@@ -23333,166 +24032,13 @@
   <p:clrMapOvr>
     <a:masterClrMapping/>
   </p:clrMapOvr>
-</p:sld>
-</file>
-
-<file path=ppt/slides/slide26.xml><?xml version="1.0" encoding="utf-8"?>
-<p:sld xmlns:a="http://schemas.openxmlformats.org/drawingml/2006/main" xmlns:r="http://schemas.openxmlformats.org/officeDocument/2006/relationships" xmlns:p="http://schemas.openxmlformats.org/presentationml/2006/main">
-  <p:cSld>
-    <p:spTree>
-      <p:nvGrpSpPr>
-        <p:cNvPr id="1" name=""/>
-        <p:cNvGrpSpPr/>
-        <p:nvPr/>
-      </p:nvGrpSpPr>
-      <p:grpSpPr>
-        <a:xfrm>
-          <a:off x="0" y="0"/>
-          <a:ext cx="0" cy="0"/>
-          <a:chOff x="0" y="0"/>
-          <a:chExt cx="0" cy="0"/>
-        </a:xfrm>
-      </p:grpSpPr>
-      <p:sp>
-        <p:nvSpPr>
-          <p:cNvPr id="2" name="Title 1"/>
-          <p:cNvSpPr>
-            <a:spLocks noGrp="1"/>
-          </p:cNvSpPr>
-          <p:nvPr>
-            <p:ph type="ctrTitle"/>
-          </p:nvPr>
-        </p:nvSpPr>
-        <p:spPr/>
-        <p:txBody>
-          <a:bodyPr/>
-          <a:lstStyle/>
-          <a:p>
-            <a:r>
-              <a:rPr lang="en-US" dirty="0" smtClean="0"/>
-              <a:t>Vragen?</a:t>
-            </a:r>
-            <a:endParaRPr lang="en-US" dirty="0"/>
-          </a:p>
-        </p:txBody>
-      </p:sp>
-      <p:sp>
-        <p:nvSpPr>
-          <p:cNvPr id="3" name="Subtitle 2"/>
-          <p:cNvSpPr>
-            <a:spLocks noGrp="1"/>
-          </p:cNvSpPr>
-          <p:nvPr>
-            <p:ph type="subTitle" idx="1"/>
-          </p:nvPr>
-        </p:nvSpPr>
-        <p:spPr/>
-        <p:txBody>
-          <a:bodyPr/>
-          <a:lstStyle/>
-          <a:p>
-            <a:endParaRPr lang="en-US" dirty="0"/>
-          </a:p>
-        </p:txBody>
-      </p:sp>
-    </p:spTree>
-    <p:extLst>
-      <p:ext uri="{BB962C8B-B14F-4D97-AF65-F5344CB8AC3E}">
-        <p14:creationId xmlns:p14="http://schemas.microsoft.com/office/powerpoint/2010/main" val="184649616"/>
-      </p:ext>
-    </p:extLst>
-  </p:cSld>
-  <p:clrMapOvr>
-    <a:masterClrMapping/>
-  </p:clrMapOvr>
-</p:sld>
-</file>
-
-<file path=ppt/slides/slide27.xml><?xml version="1.0" encoding="utf-8"?>
-<p:sld xmlns:a="http://schemas.openxmlformats.org/drawingml/2006/main" xmlns:r="http://schemas.openxmlformats.org/officeDocument/2006/relationships" xmlns:p="http://schemas.openxmlformats.org/presentationml/2006/main">
-  <p:cSld>
-    <p:spTree>
-      <p:nvGrpSpPr>
-        <p:cNvPr id="1" name=""/>
-        <p:cNvGrpSpPr/>
-        <p:nvPr/>
-      </p:nvGrpSpPr>
-      <p:grpSpPr>
-        <a:xfrm>
-          <a:off x="0" y="0"/>
-          <a:ext cx="0" cy="0"/>
-          <a:chOff x="0" y="0"/>
-          <a:chExt cx="0" cy="0"/>
-        </a:xfrm>
-      </p:grpSpPr>
-      <p:sp>
-        <p:nvSpPr>
-          <p:cNvPr id="2" name="Title 1"/>
-          <p:cNvSpPr>
-            <a:spLocks noGrp="1"/>
-          </p:cNvSpPr>
-          <p:nvPr>
-            <p:ph type="ctrTitle"/>
-          </p:nvPr>
-        </p:nvSpPr>
-        <p:spPr/>
-        <p:txBody>
-          <a:bodyPr/>
-          <a:lstStyle/>
-          <a:p>
-            <a:r>
-              <a:rPr lang="en-US" dirty="0" err="1" smtClean="0"/>
-              <a:t>Bedankt</a:t>
-            </a:r>
-            <a:r>
-              <a:rPr lang="en-US" dirty="0" smtClean="0"/>
-              <a:t> </a:t>
-            </a:r>
-            <a:r>
-              <a:rPr lang="en-US" dirty="0" err="1" smtClean="0"/>
-              <a:t>voor</a:t>
-            </a:r>
-            <a:r>
-              <a:rPr lang="en-US" dirty="0" smtClean="0"/>
-              <a:t> de </a:t>
-            </a:r>
-            <a:r>
-              <a:rPr lang="en-US" dirty="0" err="1" smtClean="0"/>
-              <a:t>aandacht</a:t>
-            </a:r>
-            <a:endParaRPr lang="en-US" dirty="0"/>
-          </a:p>
-        </p:txBody>
-      </p:sp>
-      <p:sp>
-        <p:nvSpPr>
-          <p:cNvPr id="3" name="Subtitle 2"/>
-          <p:cNvSpPr>
-            <a:spLocks noGrp="1"/>
-          </p:cNvSpPr>
-          <p:nvPr>
-            <p:ph type="subTitle" idx="1"/>
-          </p:nvPr>
-        </p:nvSpPr>
-        <p:spPr/>
-        <p:txBody>
-          <a:bodyPr/>
-          <a:lstStyle/>
-          <a:p>
-            <a:endParaRPr lang="en-US" dirty="0"/>
-          </a:p>
-        </p:txBody>
-      </p:sp>
-    </p:spTree>
-    <p:extLst>
-      <p:ext uri="{BB962C8B-B14F-4D97-AF65-F5344CB8AC3E}">
-        <p14:creationId xmlns:p14="http://schemas.microsoft.com/office/powerpoint/2010/main" val="1063625407"/>
-      </p:ext>
-    </p:extLst>
-  </p:cSld>
-  <p:clrMapOvr>
-    <a:masterClrMapping/>
-  </p:clrMapOvr>
+  <p:timing>
+    <p:tnLst>
+      <p:par>
+        <p:cTn xmlns:p14="http://schemas.microsoft.com/office/powerpoint/2010/main" id="1" dur="indefinite" restart="never" nodeType="tmRoot"/>
+      </p:par>
+    </p:tnLst>
+  </p:timing>
 </p:sld>
 </file>
 
@@ -23563,6 +24109,180 @@
     <p:extLst>
       <p:ext uri="{BB962C8B-B14F-4D97-AF65-F5344CB8AC3E}">
         <p14:creationId xmlns:p14="http://schemas.microsoft.com/office/powerpoint/2010/main" val="2707902490"/>
+      </p:ext>
+    </p:extLst>
+  </p:cSld>
+  <p:clrMapOvr>
+    <a:masterClrMapping/>
+  </p:clrMapOvr>
+  <p:timing>
+    <p:tnLst>
+      <p:par>
+        <p:cTn xmlns:p14="http://schemas.microsoft.com/office/powerpoint/2010/main" id="1" dur="indefinite" restart="never" nodeType="tmRoot"/>
+      </p:par>
+    </p:tnLst>
+  </p:timing>
+</p:sld>
+</file>
+
+<file path=ppt/slides/slide30.xml><?xml version="1.0" encoding="utf-8"?>
+<p:sld xmlns:a="http://schemas.openxmlformats.org/drawingml/2006/main" xmlns:r="http://schemas.openxmlformats.org/officeDocument/2006/relationships" xmlns:p="http://schemas.openxmlformats.org/presentationml/2006/main">
+  <p:cSld>
+    <p:spTree>
+      <p:nvGrpSpPr>
+        <p:cNvPr id="1" name=""/>
+        <p:cNvGrpSpPr/>
+        <p:nvPr/>
+      </p:nvGrpSpPr>
+      <p:grpSpPr>
+        <a:xfrm>
+          <a:off x="0" y="0"/>
+          <a:ext cx="0" cy="0"/>
+          <a:chOff x="0" y="0"/>
+          <a:chExt cx="0" cy="0"/>
+        </a:xfrm>
+      </p:grpSpPr>
+      <p:sp>
+        <p:nvSpPr>
+          <p:cNvPr id="2" name="Title 1"/>
+          <p:cNvSpPr>
+            <a:spLocks noGrp="1"/>
+          </p:cNvSpPr>
+          <p:nvPr>
+            <p:ph type="ctrTitle"/>
+          </p:nvPr>
+        </p:nvSpPr>
+        <p:spPr/>
+        <p:txBody>
+          <a:bodyPr/>
+          <a:lstStyle/>
+          <a:p>
+            <a:r>
+              <a:rPr lang="en-US" dirty="0" smtClean="0"/>
+              <a:t>Vragen?</a:t>
+            </a:r>
+            <a:endParaRPr lang="en-US" dirty="0"/>
+          </a:p>
+        </p:txBody>
+      </p:sp>
+      <p:sp>
+        <p:nvSpPr>
+          <p:cNvPr id="3" name="Subtitle 2"/>
+          <p:cNvSpPr>
+            <a:spLocks noGrp="1"/>
+          </p:cNvSpPr>
+          <p:nvPr>
+            <p:ph type="subTitle" idx="1"/>
+          </p:nvPr>
+        </p:nvSpPr>
+        <p:spPr/>
+        <p:txBody>
+          <a:bodyPr/>
+          <a:lstStyle/>
+          <a:p>
+            <a:endParaRPr lang="en-US" dirty="0"/>
+          </a:p>
+        </p:txBody>
+      </p:sp>
+    </p:spTree>
+    <p:extLst>
+      <p:ext uri="{BB962C8B-B14F-4D97-AF65-F5344CB8AC3E}">
+        <p14:creationId xmlns:p14="http://schemas.microsoft.com/office/powerpoint/2010/main" val="184649616"/>
+      </p:ext>
+    </p:extLst>
+  </p:cSld>
+  <p:clrMapOvr>
+    <a:masterClrMapping/>
+  </p:clrMapOvr>
+  <p:timing>
+    <p:tnLst>
+      <p:par>
+        <p:cTn xmlns:p14="http://schemas.microsoft.com/office/powerpoint/2010/main" id="1" dur="indefinite" restart="never" nodeType="tmRoot"/>
+      </p:par>
+    </p:tnLst>
+  </p:timing>
+</p:sld>
+</file>
+
+<file path=ppt/slides/slide31.xml><?xml version="1.0" encoding="utf-8"?>
+<p:sld xmlns:a="http://schemas.openxmlformats.org/drawingml/2006/main" xmlns:r="http://schemas.openxmlformats.org/officeDocument/2006/relationships" xmlns:p="http://schemas.openxmlformats.org/presentationml/2006/main">
+  <p:cSld>
+    <p:spTree>
+      <p:nvGrpSpPr>
+        <p:cNvPr id="1" name=""/>
+        <p:cNvGrpSpPr/>
+        <p:nvPr/>
+      </p:nvGrpSpPr>
+      <p:grpSpPr>
+        <a:xfrm>
+          <a:off x="0" y="0"/>
+          <a:ext cx="0" cy="0"/>
+          <a:chOff x="0" y="0"/>
+          <a:chExt cx="0" cy="0"/>
+        </a:xfrm>
+      </p:grpSpPr>
+      <p:sp>
+        <p:nvSpPr>
+          <p:cNvPr id="2" name="Title 1"/>
+          <p:cNvSpPr>
+            <a:spLocks noGrp="1"/>
+          </p:cNvSpPr>
+          <p:nvPr>
+            <p:ph type="ctrTitle"/>
+          </p:nvPr>
+        </p:nvSpPr>
+        <p:spPr/>
+        <p:txBody>
+          <a:bodyPr/>
+          <a:lstStyle/>
+          <a:p>
+            <a:r>
+              <a:rPr lang="en-US" dirty="0" err="1" smtClean="0"/>
+              <a:t>Bedankt</a:t>
+            </a:r>
+            <a:r>
+              <a:rPr lang="en-US" dirty="0" smtClean="0"/>
+              <a:t> </a:t>
+            </a:r>
+            <a:r>
+              <a:rPr lang="en-US" dirty="0" err="1" smtClean="0"/>
+              <a:t>voor</a:t>
+            </a:r>
+            <a:r>
+              <a:rPr lang="en-US" dirty="0" smtClean="0"/>
+              <a:t> de </a:t>
+            </a:r>
+            <a:r>
+              <a:rPr lang="en-US" dirty="0" err="1" smtClean="0"/>
+              <a:t>aandacht</a:t>
+            </a:r>
+            <a:endParaRPr lang="en-US" dirty="0"/>
+          </a:p>
+        </p:txBody>
+      </p:sp>
+      <p:sp>
+        <p:nvSpPr>
+          <p:cNvPr id="3" name="Subtitle 2"/>
+          <p:cNvSpPr>
+            <a:spLocks noGrp="1"/>
+          </p:cNvSpPr>
+          <p:nvPr>
+            <p:ph type="subTitle" idx="1"/>
+          </p:nvPr>
+        </p:nvSpPr>
+        <p:spPr/>
+        <p:txBody>
+          <a:bodyPr/>
+          <a:lstStyle/>
+          <a:p>
+            <a:endParaRPr lang="en-US" dirty="0"/>
+          </a:p>
+        </p:txBody>
+      </p:sp>
+    </p:spTree>
+    <p:extLst>
+      <p:ext uri="{BB962C8B-B14F-4D97-AF65-F5344CB8AC3E}">
+        <p14:creationId xmlns:p14="http://schemas.microsoft.com/office/powerpoint/2010/main" val="1063625407"/>
       </p:ext>
     </p:extLst>
   </p:cSld>

</xml_diff>